<commit_message>
Handle long-press of button #4 to display system setup page
</commit_message>
<xml_diff>
--- a/Docs/PiWeatherDisplay-StartupFlow.pptx
+++ b/Docs/PiWeatherDisplay-StartupFlow.pptx
@@ -3417,7 +3417,7 @@
         <p:spPr>
           <a:xfrm>
             <a:off x="3589343" y="171395"/>
-            <a:ext cx="8406130" cy="3577645"/>
+            <a:ext cx="8406130" cy="5325165"/>
           </a:xfrm>
           <a:prstGeom prst="rect">
             <a:avLst/>
@@ -3470,7 +3470,7 @@
         </p:nvSpPr>
         <p:spPr>
           <a:xfrm>
-            <a:off x="3856018" y="1122553"/>
+            <a:off x="8974329" y="1122553"/>
             <a:ext cx="1151180" cy="707666"/>
           </a:xfrm>
           <a:prstGeom prst="rect">
@@ -3808,7 +3808,7 @@
         <p:spPr>
           <a:xfrm>
             <a:off x="2668886" y="1474032"/>
-            <a:ext cx="1187132" cy="2354"/>
+            <a:ext cx="6305443" cy="2354"/>
           </a:xfrm>
           <a:prstGeom prst="bentConnector3">
             <a:avLst/>
@@ -4026,14 +4026,14 @@
           <p:cNvCxnSpPr>
             <a:cxnSpLocks/>
             <a:stCxn id="8" idx="3"/>
-            <a:endCxn id="49" idx="1"/>
+            <a:endCxn id="70" idx="1"/>
           </p:cNvCxnSpPr>
           <p:nvPr/>
         </p:nvCxnSpPr>
         <p:spPr>
           <a:xfrm flipV="1">
-            <a:off x="2679655" y="2699439"/>
-            <a:ext cx="2727096" cy="1"/>
+            <a:off x="2679655" y="2694404"/>
+            <a:ext cx="1248159" cy="5036"/>
           </a:xfrm>
           <a:prstGeom prst="bentConnector3">
             <a:avLst/>
@@ -4071,7 +4071,7 @@
         </p:nvSpPr>
         <p:spPr>
           <a:xfrm>
-            <a:off x="5406751" y="2341850"/>
+            <a:off x="3987418" y="4138818"/>
             <a:ext cx="1235717" cy="715178"/>
           </a:xfrm>
           <a:prstGeom prst="rect">
@@ -4126,7 +4126,7 @@
         </p:nvSpPr>
         <p:spPr>
           <a:xfrm>
-            <a:off x="6976537" y="2344772"/>
+            <a:off x="5557204" y="4141740"/>
             <a:ext cx="1337217" cy="715178"/>
           </a:xfrm>
           <a:prstGeom prst="rect">
@@ -4181,7 +4181,7 @@
         </p:nvSpPr>
         <p:spPr>
           <a:xfrm>
-            <a:off x="8659725" y="2321153"/>
+            <a:off x="7240392" y="4118121"/>
             <a:ext cx="1337217" cy="715178"/>
           </a:xfrm>
           <a:prstGeom prst="rect">
@@ -4236,7 +4236,7 @@
         </p:nvSpPr>
         <p:spPr>
           <a:xfrm>
-            <a:off x="10393662" y="2321153"/>
+            <a:off x="8974329" y="4118121"/>
             <a:ext cx="1235717" cy="715178"/>
           </a:xfrm>
           <a:prstGeom prst="rect">
@@ -4295,7 +4295,7 @@
         </p:nvCxnSpPr>
         <p:spPr>
           <a:xfrm rot="5400000" flipH="1" flipV="1">
-            <a:off x="6154744" y="2569305"/>
+            <a:off x="4735411" y="4366273"/>
             <a:ext cx="357589" cy="617858"/>
           </a:xfrm>
           <a:prstGeom prst="curvedConnector4">
@@ -4341,7 +4341,7 @@
         </p:nvCxnSpPr>
         <p:spPr>
           <a:xfrm rot="5400000" flipH="1" flipV="1">
-            <a:off x="7800655" y="2546852"/>
+            <a:off x="6381322" y="4343820"/>
             <a:ext cx="357589" cy="668608"/>
           </a:xfrm>
           <a:prstGeom prst="curvedConnector4">
@@ -4387,7 +4387,7 @@
         </p:nvCxnSpPr>
         <p:spPr>
           <a:xfrm rot="5400000" flipH="1" flipV="1">
-            <a:off x="9483843" y="2523233"/>
+            <a:off x="8064510" y="4320201"/>
             <a:ext cx="357589" cy="668608"/>
           </a:xfrm>
           <a:prstGeom prst="curvedConnector4">
@@ -4433,7 +4433,7 @@
         </p:nvCxnSpPr>
         <p:spPr>
           <a:xfrm rot="5400000" flipH="1" flipV="1">
-            <a:off x="11141655" y="2548608"/>
+            <a:off x="9722322" y="4345576"/>
             <a:ext cx="357589" cy="617858"/>
           </a:xfrm>
           <a:prstGeom prst="curvedConnector4">
@@ -4479,7 +4479,7 @@
         </p:nvCxnSpPr>
         <p:spPr>
           <a:xfrm rot="5400000">
-            <a:off x="4308038" y="998981"/>
+            <a:off x="9426349" y="998981"/>
             <a:ext cx="247143" cy="1"/>
           </a:xfrm>
           <a:prstGeom prst="bentConnector3">
@@ -4508,10 +4508,10 @@
       </p:cxnSp>
       <p:sp>
         <p:nvSpPr>
-          <p:cNvPr id="90" name="Rectangle 89">
-            <a:extLst>
-              <a:ext uri="{FF2B5EF4-FFF2-40B4-BE49-F238E27FC236}">
-                <a16:creationId xmlns:a16="http://schemas.microsoft.com/office/drawing/2014/main" id="{3427E4B1-C3DE-2FAA-D586-8E0C8DB33610}"/>
+          <p:cNvPr id="91" name="Rectangle 90">
+            <a:extLst>
+              <a:ext uri="{FF2B5EF4-FFF2-40B4-BE49-F238E27FC236}">
+                <a16:creationId xmlns:a16="http://schemas.microsoft.com/office/drawing/2014/main" id="{5E5FC189-B2C8-92AC-713A-CBC222BF7479}"/>
               </a:ext>
             </a:extLst>
           </p:cNvPr>
@@ -4520,7 +4520,7 @@
         </p:nvSpPr>
         <p:spPr>
           <a:xfrm>
-            <a:off x="5667021" y="488294"/>
+            <a:off x="9192330" y="490651"/>
             <a:ext cx="715179" cy="384759"/>
           </a:xfrm>
           <a:prstGeom prst="rect">
@@ -4548,24 +4548,211 @@
             <a:pPr algn="ctr"/>
             <a:r>
               <a:rPr lang="de-CH" sz="1000" b="1" dirty="0"/>
-              <a:t>Button 1 </a:t>
+              <a:t>Button 4</a:t>
             </a:r>
           </a:p>
           <a:p>
             <a:pPr algn="ctr"/>
             <a:r>
               <a:rPr lang="de-CH" sz="1000" b="1" dirty="0"/>
-              <a:t>Press</a:t>
-            </a:r>
-          </a:p>
-        </p:txBody>
-      </p:sp>
-      <p:sp>
-        <p:nvSpPr>
-          <p:cNvPr id="91" name="Rectangle 90">
-            <a:extLst>
-              <a:ext uri="{FF2B5EF4-FFF2-40B4-BE49-F238E27FC236}">
-                <a16:creationId xmlns:a16="http://schemas.microsoft.com/office/drawing/2014/main" id="{5E5FC189-B2C8-92AC-713A-CBC222BF7479}"/>
+              <a:t>Hold</a:t>
+            </a:r>
+          </a:p>
+        </p:txBody>
+      </p:sp>
+      <p:sp>
+        <p:nvSpPr>
+          <p:cNvPr id="103" name="TextBox 102">
+            <a:extLst>
+              <a:ext uri="{FF2B5EF4-FFF2-40B4-BE49-F238E27FC236}">
+                <a16:creationId xmlns:a16="http://schemas.microsoft.com/office/drawing/2014/main" id="{CE2879F2-6CCC-F6A0-EA54-D16EE8BCE597}"/>
+              </a:ext>
+            </a:extLst>
+          </p:cNvPr>
+          <p:cNvSpPr txBox="1"/>
+          <p:nvPr/>
+        </p:nvSpPr>
+        <p:spPr>
+          <a:xfrm>
+            <a:off x="2007751" y="3113614"/>
+            <a:ext cx="360996" cy="246221"/>
+          </a:xfrm>
+          <a:prstGeom prst="rect">
+            <a:avLst/>
+          </a:prstGeom>
+          <a:noFill/>
+        </p:spPr>
+        <p:txBody>
+          <a:bodyPr wrap="none" rtlCol="0">
+            <a:spAutoFit/>
+          </a:bodyPr>
+          <a:lstStyle/>
+          <a:p>
+            <a:r>
+              <a:rPr lang="de-CH" sz="1000" dirty="0"/>
+              <a:t>Yes</a:t>
+            </a:r>
+          </a:p>
+        </p:txBody>
+      </p:sp>
+      <p:sp>
+        <p:nvSpPr>
+          <p:cNvPr id="104" name="TextBox 103">
+            <a:extLst>
+              <a:ext uri="{FF2B5EF4-FFF2-40B4-BE49-F238E27FC236}">
+                <a16:creationId xmlns:a16="http://schemas.microsoft.com/office/drawing/2014/main" id="{498289F0-9874-05F2-D915-AEB46D984A83}"/>
+              </a:ext>
+            </a:extLst>
+          </p:cNvPr>
+          <p:cNvSpPr txBox="1"/>
+          <p:nvPr/>
+        </p:nvSpPr>
+        <p:spPr>
+          <a:xfrm>
+            <a:off x="2651274" y="2448183"/>
+            <a:ext cx="335348" cy="246221"/>
+          </a:xfrm>
+          <a:prstGeom prst="rect">
+            <a:avLst/>
+          </a:prstGeom>
+          <a:noFill/>
+        </p:spPr>
+        <p:txBody>
+          <a:bodyPr wrap="none" rtlCol="0">
+            <a:spAutoFit/>
+          </a:bodyPr>
+          <a:lstStyle/>
+          <a:p>
+            <a:r>
+              <a:rPr lang="de-CH" sz="1000" dirty="0" err="1"/>
+              <a:t>No</a:t>
+            </a:r>
+            <a:endParaRPr lang="de-CH" sz="1000" dirty="0"/>
+          </a:p>
+        </p:txBody>
+      </p:sp>
+      <p:sp>
+        <p:nvSpPr>
+          <p:cNvPr id="105" name="TextBox 104">
+            <a:extLst>
+              <a:ext uri="{FF2B5EF4-FFF2-40B4-BE49-F238E27FC236}">
+                <a16:creationId xmlns:a16="http://schemas.microsoft.com/office/drawing/2014/main" id="{ED8D963A-BD80-016E-01ED-E306AE45A762}"/>
+              </a:ext>
+            </a:extLst>
+          </p:cNvPr>
+          <p:cNvSpPr txBox="1"/>
+          <p:nvPr/>
+        </p:nvSpPr>
+        <p:spPr>
+          <a:xfrm>
+            <a:off x="2679655" y="1179347"/>
+            <a:ext cx="360996" cy="246221"/>
+          </a:xfrm>
+          <a:prstGeom prst="rect">
+            <a:avLst/>
+          </a:prstGeom>
+          <a:noFill/>
+        </p:spPr>
+        <p:txBody>
+          <a:bodyPr wrap="none" rtlCol="0">
+            <a:spAutoFit/>
+          </a:bodyPr>
+          <a:lstStyle/>
+          <a:p>
+            <a:r>
+              <a:rPr lang="de-CH" sz="1000" dirty="0"/>
+              <a:t>Yes</a:t>
+            </a:r>
+          </a:p>
+        </p:txBody>
+      </p:sp>
+      <p:sp>
+        <p:nvSpPr>
+          <p:cNvPr id="106" name="TextBox 105">
+            <a:extLst>
+              <a:ext uri="{FF2B5EF4-FFF2-40B4-BE49-F238E27FC236}">
+                <a16:creationId xmlns:a16="http://schemas.microsoft.com/office/drawing/2014/main" id="{C7973BF0-7264-CA1F-4533-0323C5232B1E}"/>
+              </a:ext>
+            </a:extLst>
+          </p:cNvPr>
+          <p:cNvSpPr txBox="1"/>
+          <p:nvPr/>
+        </p:nvSpPr>
+        <p:spPr>
+          <a:xfrm>
+            <a:off x="2017493" y="1872709"/>
+            <a:ext cx="335348" cy="246221"/>
+          </a:xfrm>
+          <a:prstGeom prst="rect">
+            <a:avLst/>
+          </a:prstGeom>
+          <a:noFill/>
+        </p:spPr>
+        <p:txBody>
+          <a:bodyPr wrap="none" rtlCol="0">
+            <a:spAutoFit/>
+          </a:bodyPr>
+          <a:lstStyle/>
+          <a:p>
+            <a:r>
+              <a:rPr lang="de-CH" sz="1000" dirty="0" err="1"/>
+              <a:t>No</a:t>
+            </a:r>
+            <a:endParaRPr lang="de-CH" sz="1000" dirty="0"/>
+          </a:p>
+        </p:txBody>
+      </p:sp>
+      <p:cxnSp>
+        <p:nvCxnSpPr>
+          <p:cNvPr id="111" name="Connector: Elbow 110">
+            <a:extLst>
+              <a:ext uri="{FF2B5EF4-FFF2-40B4-BE49-F238E27FC236}">
+                <a16:creationId xmlns:a16="http://schemas.microsoft.com/office/drawing/2014/main" id="{EBC89178-805F-E7A5-289B-0856967643E5}"/>
+              </a:ext>
+            </a:extLst>
+          </p:cNvPr>
+          <p:cNvCxnSpPr>
+            <a:cxnSpLocks/>
+            <a:stCxn id="90" idx="2"/>
+            <a:endCxn id="49" idx="0"/>
+          </p:cNvCxnSpPr>
+          <p:nvPr/>
+        </p:nvCxnSpPr>
+        <p:spPr>
+          <a:xfrm rot="5400000">
+            <a:off x="4442094" y="3975634"/>
+            <a:ext cx="326368" cy="1"/>
+          </a:xfrm>
+          <a:prstGeom prst="bentConnector3">
+            <a:avLst>
+              <a:gd name="adj1" fmla="val 50000"/>
+            </a:avLst>
+          </a:prstGeom>
+          <a:ln>
+            <a:tailEnd type="triangle"/>
+          </a:ln>
+        </p:spPr>
+        <p:style>
+          <a:lnRef idx="1">
+            <a:schemeClr val="accent1"/>
+          </a:lnRef>
+          <a:fillRef idx="0">
+            <a:schemeClr val="accent1"/>
+          </a:fillRef>
+          <a:effectRef idx="0">
+            <a:schemeClr val="accent1"/>
+          </a:effectRef>
+          <a:fontRef idx="minor">
+            <a:schemeClr val="tx1"/>
+          </a:fontRef>
+        </p:style>
+      </p:cxnSp>
+      <p:sp>
+        <p:nvSpPr>
+          <p:cNvPr id="132" name="Rectangle 131">
+            <a:extLst>
+              <a:ext uri="{FF2B5EF4-FFF2-40B4-BE49-F238E27FC236}">
+                <a16:creationId xmlns:a16="http://schemas.microsoft.com/office/drawing/2014/main" id="{4EAF10E3-6CFD-3223-D61E-BD07C1E470EB}"/>
               </a:ext>
             </a:extLst>
           </p:cNvPr>
@@ -4574,7 +4761,7 @@
         </p:nvSpPr>
         <p:spPr>
           <a:xfrm>
-            <a:off x="4074019" y="490651"/>
+            <a:off x="5874174" y="3427691"/>
             <a:ext cx="715179" cy="384759"/>
           </a:xfrm>
           <a:prstGeom prst="rect">
@@ -4602,180 +4789,38 @@
             <a:pPr algn="ctr"/>
             <a:r>
               <a:rPr lang="de-CH" sz="1000" b="1" dirty="0"/>
-              <a:t>Button 4</a:t>
+              <a:t>Button 2 </a:t>
             </a:r>
           </a:p>
           <a:p>
             <a:pPr algn="ctr"/>
             <a:r>
               <a:rPr lang="de-CH" sz="1000" b="1" dirty="0"/>
-              <a:t>Hold</a:t>
-            </a:r>
-          </a:p>
-        </p:txBody>
-      </p:sp>
-      <p:sp>
-        <p:nvSpPr>
-          <p:cNvPr id="103" name="TextBox 102">
-            <a:extLst>
-              <a:ext uri="{FF2B5EF4-FFF2-40B4-BE49-F238E27FC236}">
-                <a16:creationId xmlns:a16="http://schemas.microsoft.com/office/drawing/2014/main" id="{CE2879F2-6CCC-F6A0-EA54-D16EE8BCE597}"/>
-              </a:ext>
-            </a:extLst>
-          </p:cNvPr>
-          <p:cNvSpPr txBox="1"/>
-          <p:nvPr/>
-        </p:nvSpPr>
-        <p:spPr>
-          <a:xfrm>
-            <a:off x="2007751" y="3113614"/>
-            <a:ext cx="360996" cy="246221"/>
-          </a:xfrm>
-          <a:prstGeom prst="rect">
-            <a:avLst/>
-          </a:prstGeom>
-          <a:noFill/>
-        </p:spPr>
-        <p:txBody>
-          <a:bodyPr wrap="none" rtlCol="0">
-            <a:spAutoFit/>
-          </a:bodyPr>
-          <a:lstStyle/>
-          <a:p>
-            <a:r>
-              <a:rPr lang="de-CH" sz="1000" dirty="0"/>
-              <a:t>Yes</a:t>
-            </a:r>
-          </a:p>
-        </p:txBody>
-      </p:sp>
-      <p:sp>
-        <p:nvSpPr>
-          <p:cNvPr id="104" name="TextBox 103">
-            <a:extLst>
-              <a:ext uri="{FF2B5EF4-FFF2-40B4-BE49-F238E27FC236}">
-                <a16:creationId xmlns:a16="http://schemas.microsoft.com/office/drawing/2014/main" id="{498289F0-9874-05F2-D915-AEB46D984A83}"/>
-              </a:ext>
-            </a:extLst>
-          </p:cNvPr>
-          <p:cNvSpPr txBox="1"/>
-          <p:nvPr/>
-        </p:nvSpPr>
-        <p:spPr>
-          <a:xfrm>
-            <a:off x="2651274" y="2448183"/>
-            <a:ext cx="335348" cy="246221"/>
-          </a:xfrm>
-          <a:prstGeom prst="rect">
-            <a:avLst/>
-          </a:prstGeom>
-          <a:noFill/>
-        </p:spPr>
-        <p:txBody>
-          <a:bodyPr wrap="none" rtlCol="0">
-            <a:spAutoFit/>
-          </a:bodyPr>
-          <a:lstStyle/>
-          <a:p>
-            <a:r>
-              <a:rPr lang="de-CH" sz="1000" dirty="0" err="1"/>
-              <a:t>No</a:t>
-            </a:r>
-            <a:endParaRPr lang="de-CH" sz="1000" dirty="0"/>
-          </a:p>
-        </p:txBody>
-      </p:sp>
-      <p:sp>
-        <p:nvSpPr>
-          <p:cNvPr id="105" name="TextBox 104">
-            <a:extLst>
-              <a:ext uri="{FF2B5EF4-FFF2-40B4-BE49-F238E27FC236}">
-                <a16:creationId xmlns:a16="http://schemas.microsoft.com/office/drawing/2014/main" id="{ED8D963A-BD80-016E-01ED-E306AE45A762}"/>
-              </a:ext>
-            </a:extLst>
-          </p:cNvPr>
-          <p:cNvSpPr txBox="1"/>
-          <p:nvPr/>
-        </p:nvSpPr>
-        <p:spPr>
-          <a:xfrm>
-            <a:off x="2679655" y="1179347"/>
-            <a:ext cx="360996" cy="246221"/>
-          </a:xfrm>
-          <a:prstGeom prst="rect">
-            <a:avLst/>
-          </a:prstGeom>
-          <a:noFill/>
-        </p:spPr>
-        <p:txBody>
-          <a:bodyPr wrap="none" rtlCol="0">
-            <a:spAutoFit/>
-          </a:bodyPr>
-          <a:lstStyle/>
-          <a:p>
-            <a:r>
-              <a:rPr lang="de-CH" sz="1000" dirty="0"/>
-              <a:t>Yes</a:t>
-            </a:r>
-          </a:p>
-        </p:txBody>
-      </p:sp>
-      <p:sp>
-        <p:nvSpPr>
-          <p:cNvPr id="106" name="TextBox 105">
-            <a:extLst>
-              <a:ext uri="{FF2B5EF4-FFF2-40B4-BE49-F238E27FC236}">
-                <a16:creationId xmlns:a16="http://schemas.microsoft.com/office/drawing/2014/main" id="{C7973BF0-7264-CA1F-4533-0323C5232B1E}"/>
-              </a:ext>
-            </a:extLst>
-          </p:cNvPr>
-          <p:cNvSpPr txBox="1"/>
-          <p:nvPr/>
-        </p:nvSpPr>
-        <p:spPr>
-          <a:xfrm>
-            <a:off x="2017493" y="1872709"/>
-            <a:ext cx="335348" cy="246221"/>
-          </a:xfrm>
-          <a:prstGeom prst="rect">
-            <a:avLst/>
-          </a:prstGeom>
-          <a:noFill/>
-        </p:spPr>
-        <p:txBody>
-          <a:bodyPr wrap="none" rtlCol="0">
-            <a:spAutoFit/>
-          </a:bodyPr>
-          <a:lstStyle/>
-          <a:p>
-            <a:r>
-              <a:rPr lang="de-CH" sz="1000" dirty="0" err="1"/>
-              <a:t>No</a:t>
-            </a:r>
-            <a:endParaRPr lang="de-CH" sz="1000" dirty="0"/>
+              <a:t>Press</a:t>
+            </a:r>
           </a:p>
         </p:txBody>
       </p:sp>
       <p:cxnSp>
         <p:nvCxnSpPr>
-          <p:cNvPr id="111" name="Connector: Elbow 110">
-            <a:extLst>
-              <a:ext uri="{FF2B5EF4-FFF2-40B4-BE49-F238E27FC236}">
-                <a16:creationId xmlns:a16="http://schemas.microsoft.com/office/drawing/2014/main" id="{EBC89178-805F-E7A5-289B-0856967643E5}"/>
+          <p:cNvPr id="133" name="Connector: Elbow 132">
+            <a:extLst>
+              <a:ext uri="{FF2B5EF4-FFF2-40B4-BE49-F238E27FC236}">
+                <a16:creationId xmlns:a16="http://schemas.microsoft.com/office/drawing/2014/main" id="{6FB3AF8D-9FD8-5EC1-B8DA-D3274A1DDDEB}"/>
               </a:ext>
             </a:extLst>
           </p:cNvPr>
           <p:cNvCxnSpPr>
             <a:cxnSpLocks/>
-            <a:stCxn id="90" idx="2"/>
-            <a:endCxn id="49" idx="0"/>
+            <a:stCxn id="132" idx="2"/>
+            <a:endCxn id="50" idx="0"/>
           </p:cNvCxnSpPr>
           <p:nvPr/>
         </p:nvCxnSpPr>
         <p:spPr>
           <a:xfrm rot="5400000">
-            <a:off x="5290213" y="1607451"/>
-            <a:ext cx="1468797" cy="1"/>
+            <a:off x="6064144" y="3974120"/>
+            <a:ext cx="329290" cy="5951"/>
           </a:xfrm>
           <a:prstGeom prst="bentConnector3">
             <a:avLst>
@@ -4803,10 +4848,10 @@
       </p:cxnSp>
       <p:sp>
         <p:nvSpPr>
-          <p:cNvPr id="132" name="Rectangle 131">
-            <a:extLst>
-              <a:ext uri="{FF2B5EF4-FFF2-40B4-BE49-F238E27FC236}">
-                <a16:creationId xmlns:a16="http://schemas.microsoft.com/office/drawing/2014/main" id="{4EAF10E3-6CFD-3223-D61E-BD07C1E470EB}"/>
+          <p:cNvPr id="134" name="Rectangle 133">
+            <a:extLst>
+              <a:ext uri="{FF2B5EF4-FFF2-40B4-BE49-F238E27FC236}">
+                <a16:creationId xmlns:a16="http://schemas.microsoft.com/office/drawing/2014/main" id="{37768289-0D45-7563-EC75-55CB4F758C53}"/>
               </a:ext>
             </a:extLst>
           </p:cNvPr>
@@ -4815,7 +4860,7 @@
         </p:nvSpPr>
         <p:spPr>
           <a:xfrm>
-            <a:off x="7293507" y="488294"/>
+            <a:off x="7551410" y="3398776"/>
             <a:ext cx="715179" cy="384759"/>
           </a:xfrm>
           <a:prstGeom prst="rect">
@@ -4843,7 +4888,7 @@
             <a:pPr algn="ctr"/>
             <a:r>
               <a:rPr lang="de-CH" sz="1000" b="1" dirty="0"/>
-              <a:t>Button 2 </a:t>
+              <a:t>Button 3 </a:t>
             </a:r>
           </a:p>
           <a:p>
@@ -4857,23 +4902,24 @@
       </p:sp>
       <p:cxnSp>
         <p:nvCxnSpPr>
-          <p:cNvPr id="133" name="Connector: Elbow 132">
-            <a:extLst>
-              <a:ext uri="{FF2B5EF4-FFF2-40B4-BE49-F238E27FC236}">
-                <a16:creationId xmlns:a16="http://schemas.microsoft.com/office/drawing/2014/main" id="{6FB3AF8D-9FD8-5EC1-B8DA-D3274A1DDDEB}"/>
+          <p:cNvPr id="135" name="Connector: Elbow 134">
+            <a:extLst>
+              <a:ext uri="{FF2B5EF4-FFF2-40B4-BE49-F238E27FC236}">
+                <a16:creationId xmlns:a16="http://schemas.microsoft.com/office/drawing/2014/main" id="{D84DF598-BDF7-2930-9279-736447C69E9B}"/>
               </a:ext>
             </a:extLst>
           </p:cNvPr>
           <p:cNvCxnSpPr>
             <a:cxnSpLocks/>
-            <a:stCxn id="132" idx="2"/>
+            <a:stCxn id="134" idx="2"/>
+            <a:endCxn id="51" idx="0"/>
           </p:cNvCxnSpPr>
           <p:nvPr/>
         </p:nvCxnSpPr>
         <p:spPr>
-          <a:xfrm rot="5400000">
-            <a:off x="6916699" y="1607451"/>
-            <a:ext cx="1468797" cy="1"/>
+          <a:xfrm rot="16200000" flipH="1">
+            <a:off x="7741707" y="3950827"/>
+            <a:ext cx="334586" cy="1"/>
           </a:xfrm>
           <a:prstGeom prst="bentConnector3">
             <a:avLst>
@@ -4901,10 +4947,10 @@
       </p:cxnSp>
       <p:sp>
         <p:nvSpPr>
-          <p:cNvPr id="134" name="Rectangle 133">
-            <a:extLst>
-              <a:ext uri="{FF2B5EF4-FFF2-40B4-BE49-F238E27FC236}">
-                <a16:creationId xmlns:a16="http://schemas.microsoft.com/office/drawing/2014/main" id="{37768289-0D45-7563-EC75-55CB4F758C53}"/>
+          <p:cNvPr id="136" name="Rectangle 135">
+            <a:extLst>
+              <a:ext uri="{FF2B5EF4-FFF2-40B4-BE49-F238E27FC236}">
+                <a16:creationId xmlns:a16="http://schemas.microsoft.com/office/drawing/2014/main" id="{4AF5A014-33FC-9390-CE5C-74F9A165AB40}"/>
               </a:ext>
             </a:extLst>
           </p:cNvPr>
@@ -4913,7 +4959,7 @@
         </p:nvSpPr>
         <p:spPr>
           <a:xfrm>
-            <a:off x="8970743" y="459379"/>
+            <a:off x="9228645" y="3410879"/>
             <a:ext cx="715179" cy="384759"/>
           </a:xfrm>
           <a:prstGeom prst="rect">
@@ -4941,7 +4987,7 @@
             <a:pPr algn="ctr"/>
             <a:r>
               <a:rPr lang="de-CH" sz="1000" b="1" dirty="0"/>
-              <a:t>Button 3 </a:t>
+              <a:t>Button 4 </a:t>
             </a:r>
           </a:p>
           <a:p>
@@ -4955,23 +5001,24 @@
       </p:sp>
       <p:cxnSp>
         <p:nvCxnSpPr>
-          <p:cNvPr id="135" name="Connector: Elbow 134">
-            <a:extLst>
-              <a:ext uri="{FF2B5EF4-FFF2-40B4-BE49-F238E27FC236}">
-                <a16:creationId xmlns:a16="http://schemas.microsoft.com/office/drawing/2014/main" id="{D84DF598-BDF7-2930-9279-736447C69E9B}"/>
+          <p:cNvPr id="137" name="Connector: Elbow 136">
+            <a:extLst>
+              <a:ext uri="{FF2B5EF4-FFF2-40B4-BE49-F238E27FC236}">
+                <a16:creationId xmlns:a16="http://schemas.microsoft.com/office/drawing/2014/main" id="{E7D48313-086D-51F9-441F-85F1F6DE904F}"/>
               </a:ext>
             </a:extLst>
           </p:cNvPr>
           <p:cNvCxnSpPr>
             <a:cxnSpLocks/>
-            <a:stCxn id="134" idx="2"/>
+            <a:stCxn id="136" idx="2"/>
+            <a:endCxn id="52" idx="0"/>
           </p:cNvCxnSpPr>
           <p:nvPr/>
         </p:nvCxnSpPr>
         <p:spPr>
-          <a:xfrm rot="5400000">
-            <a:off x="8593935" y="1578536"/>
-            <a:ext cx="1468797" cy="1"/>
+          <a:xfrm rot="16200000" flipH="1">
+            <a:off x="9427970" y="3953902"/>
+            <a:ext cx="322483" cy="5953"/>
           </a:xfrm>
           <a:prstGeom prst="bentConnector3">
             <a:avLst>
@@ -4999,10 +5046,10 @@
       </p:cxnSp>
       <p:sp>
         <p:nvSpPr>
-          <p:cNvPr id="136" name="Rectangle 135">
-            <a:extLst>
-              <a:ext uri="{FF2B5EF4-FFF2-40B4-BE49-F238E27FC236}">
-                <a16:creationId xmlns:a16="http://schemas.microsoft.com/office/drawing/2014/main" id="{4AF5A014-33FC-9390-CE5C-74F9A165AB40}"/>
+          <p:cNvPr id="26" name="Rectangle 25">
+            <a:extLst>
+              <a:ext uri="{FF2B5EF4-FFF2-40B4-BE49-F238E27FC236}">
+                <a16:creationId xmlns:a16="http://schemas.microsoft.com/office/drawing/2014/main" id="{202F33DD-C16B-D0E9-2653-10D201EAC46C}"/>
               </a:ext>
             </a:extLst>
           </p:cNvPr>
@@ -5011,7 +5058,7 @@
         </p:nvSpPr>
         <p:spPr>
           <a:xfrm>
-            <a:off x="10647978" y="471482"/>
+            <a:off x="9187582" y="2155850"/>
             <a:ext cx="715179" cy="384759"/>
           </a:xfrm>
           <a:prstGeom prst="rect">
@@ -5039,37 +5086,364 @@
             <a:pPr algn="ctr"/>
             <a:r>
               <a:rPr lang="de-CH" sz="1000" b="1" dirty="0"/>
-              <a:t>Button 4 </a:t>
+              <a:t>Button 4</a:t>
             </a:r>
           </a:p>
           <a:p>
             <a:pPr algn="ctr"/>
             <a:r>
               <a:rPr lang="de-CH" sz="1000" b="1" dirty="0"/>
-              <a:t>Press</a:t>
+              <a:t>Hold</a:t>
             </a:r>
           </a:p>
         </p:txBody>
       </p:sp>
       <p:cxnSp>
         <p:nvCxnSpPr>
-          <p:cNvPr id="137" name="Connector: Elbow 136">
-            <a:extLst>
-              <a:ext uri="{FF2B5EF4-FFF2-40B4-BE49-F238E27FC236}">
-                <a16:creationId xmlns:a16="http://schemas.microsoft.com/office/drawing/2014/main" id="{E7D48313-086D-51F9-441F-85F1F6DE904F}"/>
+          <p:cNvPr id="29" name="Connector: Elbow 28">
+            <a:extLst>
+              <a:ext uri="{FF2B5EF4-FFF2-40B4-BE49-F238E27FC236}">
+                <a16:creationId xmlns:a16="http://schemas.microsoft.com/office/drawing/2014/main" id="{0C8EEBF2-925C-56A3-AED1-13C556F3B555}"/>
               </a:ext>
             </a:extLst>
           </p:cNvPr>
           <p:cNvCxnSpPr>
             <a:cxnSpLocks/>
-            <a:stCxn id="136" idx="2"/>
+            <a:stCxn id="5" idx="2"/>
+            <a:endCxn id="26" idx="0"/>
           </p:cNvCxnSpPr>
           <p:nvPr/>
         </p:nvCxnSpPr>
         <p:spPr>
           <a:xfrm rot="5400000">
-            <a:off x="10271170" y="1590639"/>
-            <a:ext cx="1468797" cy="1"/>
+            <a:off x="9384731" y="1990661"/>
+            <a:ext cx="325631" cy="4747"/>
+          </a:xfrm>
+          <a:prstGeom prst="bentConnector3">
+            <a:avLst>
+              <a:gd name="adj1" fmla="val 50000"/>
+            </a:avLst>
+          </a:prstGeom>
+          <a:ln>
+            <a:tailEnd type="triangle"/>
+          </a:ln>
+        </p:spPr>
+        <p:style>
+          <a:lnRef idx="1">
+            <a:schemeClr val="accent1"/>
+          </a:lnRef>
+          <a:fillRef idx="0">
+            <a:schemeClr val="accent1"/>
+          </a:fillRef>
+          <a:effectRef idx="0">
+            <a:schemeClr val="accent1"/>
+          </a:effectRef>
+          <a:fontRef idx="minor">
+            <a:schemeClr val="tx1"/>
+          </a:fontRef>
+        </p:style>
+      </p:cxnSp>
+      <p:cxnSp>
+        <p:nvCxnSpPr>
+          <p:cNvPr id="34" name="Connector: Elbow 33">
+            <a:extLst>
+              <a:ext uri="{FF2B5EF4-FFF2-40B4-BE49-F238E27FC236}">
+                <a16:creationId xmlns:a16="http://schemas.microsoft.com/office/drawing/2014/main" id="{BA0FD417-AB64-E2BF-0EC0-6F1461C3FE40}"/>
+              </a:ext>
+            </a:extLst>
+          </p:cNvPr>
+          <p:cNvCxnSpPr>
+            <a:cxnSpLocks/>
+            <a:endCxn id="70" idx="3"/>
+          </p:cNvCxnSpPr>
+          <p:nvPr/>
+        </p:nvCxnSpPr>
+        <p:spPr>
+          <a:xfrm rot="10800000" flipV="1">
+            <a:off x="5163532" y="2358666"/>
+            <a:ext cx="4024055" cy="335737"/>
+          </a:xfrm>
+          <a:prstGeom prst="bentConnector3">
+            <a:avLst>
+              <a:gd name="adj1" fmla="val 50000"/>
+            </a:avLst>
+          </a:prstGeom>
+          <a:ln>
+            <a:tailEnd type="triangle"/>
+          </a:ln>
+        </p:spPr>
+        <p:style>
+          <a:lnRef idx="1">
+            <a:schemeClr val="accent1"/>
+          </a:lnRef>
+          <a:fillRef idx="0">
+            <a:schemeClr val="accent1"/>
+          </a:fillRef>
+          <a:effectRef idx="0">
+            <a:schemeClr val="accent1"/>
+          </a:effectRef>
+          <a:fontRef idx="minor">
+            <a:schemeClr val="tx1"/>
+          </a:fontRef>
+        </p:style>
+      </p:cxnSp>
+      <p:sp>
+        <p:nvSpPr>
+          <p:cNvPr id="53" name="Rectangle 52">
+            <a:extLst>
+              <a:ext uri="{FF2B5EF4-FFF2-40B4-BE49-F238E27FC236}">
+                <a16:creationId xmlns:a16="http://schemas.microsoft.com/office/drawing/2014/main" id="{E0A1A8CD-B30D-31A6-C433-CA63A18B0806}"/>
+              </a:ext>
+            </a:extLst>
+          </p:cNvPr>
+          <p:cNvSpPr/>
+          <p:nvPr/>
+        </p:nvSpPr>
+        <p:spPr>
+          <a:xfrm>
+            <a:off x="10621426" y="1120198"/>
+            <a:ext cx="1151180" cy="707666"/>
+          </a:xfrm>
+          <a:prstGeom prst="rect">
+            <a:avLst/>
+          </a:prstGeom>
+        </p:spPr>
+        <p:style>
+          <a:lnRef idx="2">
+            <a:schemeClr val="accent5"/>
+          </a:lnRef>
+          <a:fillRef idx="1">
+            <a:schemeClr val="lt1"/>
+          </a:fillRef>
+          <a:effectRef idx="0">
+            <a:schemeClr val="accent5"/>
+          </a:effectRef>
+          <a:fontRef idx="minor">
+            <a:schemeClr val="dk1"/>
+          </a:fontRef>
+        </p:style>
+        <p:txBody>
+          <a:bodyPr rtlCol="0" anchor="ctr"/>
+          <a:lstStyle/>
+          <a:p>
+            <a:pPr algn="ctr"/>
+            <a:r>
+              <a:rPr lang="de-CH" sz="1000" b="1" dirty="0" err="1"/>
+              <a:t>SystemInfoPage</a:t>
+            </a:r>
+            <a:endParaRPr lang="de-CH" sz="1000" b="1" dirty="0"/>
+          </a:p>
+        </p:txBody>
+      </p:sp>
+      <p:cxnSp>
+        <p:nvCxnSpPr>
+          <p:cNvPr id="54" name="Connector: Elbow 53">
+            <a:extLst>
+              <a:ext uri="{FF2B5EF4-FFF2-40B4-BE49-F238E27FC236}">
+                <a16:creationId xmlns:a16="http://schemas.microsoft.com/office/drawing/2014/main" id="{5ED6D6E2-845C-7B6B-902F-D0B8067FCD8D}"/>
+              </a:ext>
+            </a:extLst>
+          </p:cNvPr>
+          <p:cNvCxnSpPr>
+            <a:cxnSpLocks/>
+          </p:cNvCxnSpPr>
+          <p:nvPr/>
+        </p:nvCxnSpPr>
+        <p:spPr>
+          <a:xfrm>
+            <a:off x="10125512" y="1687609"/>
+            <a:ext cx="495913" cy="3"/>
+          </a:xfrm>
+          <a:prstGeom prst="bentConnector3">
+            <a:avLst>
+              <a:gd name="adj1" fmla="val 50000"/>
+            </a:avLst>
+          </a:prstGeom>
+          <a:ln>
+            <a:tailEnd type="triangle"/>
+          </a:ln>
+        </p:spPr>
+        <p:style>
+          <a:lnRef idx="1">
+            <a:schemeClr val="accent1"/>
+          </a:lnRef>
+          <a:fillRef idx="0">
+            <a:schemeClr val="accent1"/>
+          </a:fillRef>
+          <a:effectRef idx="0">
+            <a:schemeClr val="accent1"/>
+          </a:effectRef>
+          <a:fontRef idx="minor">
+            <a:schemeClr val="tx1"/>
+          </a:fontRef>
+        </p:style>
+      </p:cxnSp>
+      <p:cxnSp>
+        <p:nvCxnSpPr>
+          <p:cNvPr id="57" name="Connector: Elbow 56">
+            <a:extLst>
+              <a:ext uri="{FF2B5EF4-FFF2-40B4-BE49-F238E27FC236}">
+                <a16:creationId xmlns:a16="http://schemas.microsoft.com/office/drawing/2014/main" id="{82C381A6-7991-5EFB-0775-1FDABC2B1EFD}"/>
+              </a:ext>
+            </a:extLst>
+          </p:cNvPr>
+          <p:cNvCxnSpPr>
+            <a:cxnSpLocks/>
+          </p:cNvCxnSpPr>
+          <p:nvPr/>
+        </p:nvCxnSpPr>
+        <p:spPr>
+          <a:xfrm rot="10800000">
+            <a:off x="10125511" y="1302459"/>
+            <a:ext cx="495915" cy="8167"/>
+          </a:xfrm>
+          <a:prstGeom prst="bentConnector3">
+            <a:avLst>
+              <a:gd name="adj1" fmla="val 50000"/>
+            </a:avLst>
+          </a:prstGeom>
+          <a:ln>
+            <a:tailEnd type="triangle"/>
+          </a:ln>
+        </p:spPr>
+        <p:style>
+          <a:lnRef idx="1">
+            <a:schemeClr val="accent1"/>
+          </a:lnRef>
+          <a:fillRef idx="0">
+            <a:schemeClr val="accent1"/>
+          </a:fillRef>
+          <a:effectRef idx="0">
+            <a:schemeClr val="accent1"/>
+          </a:effectRef>
+          <a:fontRef idx="minor">
+            <a:schemeClr val="tx1"/>
+          </a:fontRef>
+        </p:style>
+      </p:cxnSp>
+      <p:sp>
+        <p:nvSpPr>
+          <p:cNvPr id="90" name="Rectangle 89">
+            <a:extLst>
+              <a:ext uri="{FF2B5EF4-FFF2-40B4-BE49-F238E27FC236}">
+                <a16:creationId xmlns:a16="http://schemas.microsoft.com/office/drawing/2014/main" id="{3427E4B1-C3DE-2FAA-D586-8E0C8DB33610}"/>
+              </a:ext>
+            </a:extLst>
+          </p:cNvPr>
+          <p:cNvSpPr/>
+          <p:nvPr/>
+        </p:nvSpPr>
+        <p:spPr>
+          <a:xfrm>
+            <a:off x="4247688" y="3427691"/>
+            <a:ext cx="715179" cy="384759"/>
+          </a:xfrm>
+          <a:prstGeom prst="rect">
+            <a:avLst/>
+          </a:prstGeom>
+        </p:spPr>
+        <p:style>
+          <a:lnRef idx="2">
+            <a:schemeClr val="accent5"/>
+          </a:lnRef>
+          <a:fillRef idx="1">
+            <a:schemeClr val="lt1"/>
+          </a:fillRef>
+          <a:effectRef idx="0">
+            <a:schemeClr val="accent5"/>
+          </a:effectRef>
+          <a:fontRef idx="minor">
+            <a:schemeClr val="dk1"/>
+          </a:fontRef>
+        </p:style>
+        <p:txBody>
+          <a:bodyPr rtlCol="0" anchor="ctr"/>
+          <a:lstStyle/>
+          <a:p>
+            <a:pPr algn="ctr"/>
+            <a:r>
+              <a:rPr lang="de-CH" sz="1000" b="1" dirty="0"/>
+              <a:t>Button 1 </a:t>
+            </a:r>
+          </a:p>
+          <a:p>
+            <a:pPr algn="ctr"/>
+            <a:r>
+              <a:rPr lang="de-CH" sz="1000" b="1" dirty="0"/>
+              <a:t>Press</a:t>
+            </a:r>
+          </a:p>
+        </p:txBody>
+      </p:sp>
+      <p:sp>
+        <p:nvSpPr>
+          <p:cNvPr id="70" name="Rectangle 69">
+            <a:extLst>
+              <a:ext uri="{FF2B5EF4-FFF2-40B4-BE49-F238E27FC236}">
+                <a16:creationId xmlns:a16="http://schemas.microsoft.com/office/drawing/2014/main" id="{99DA287F-ADEF-A320-716B-6992520613FF}"/>
+              </a:ext>
+            </a:extLst>
+          </p:cNvPr>
+          <p:cNvSpPr/>
+          <p:nvPr/>
+        </p:nvSpPr>
+        <p:spPr>
+          <a:xfrm>
+            <a:off x="3927814" y="2336815"/>
+            <a:ext cx="1235717" cy="715178"/>
+          </a:xfrm>
+          <a:prstGeom prst="rect">
+            <a:avLst/>
+          </a:prstGeom>
+        </p:spPr>
+        <p:style>
+          <a:lnRef idx="2">
+            <a:schemeClr val="accent5"/>
+          </a:lnRef>
+          <a:fillRef idx="1">
+            <a:schemeClr val="lt1"/>
+          </a:fillRef>
+          <a:effectRef idx="0">
+            <a:schemeClr val="accent5"/>
+          </a:effectRef>
+          <a:fontRef idx="minor">
+            <a:schemeClr val="dk1"/>
+          </a:fontRef>
+        </p:style>
+        <p:txBody>
+          <a:bodyPr rtlCol="0" anchor="ctr"/>
+          <a:lstStyle/>
+          <a:p>
+            <a:pPr algn="ctr"/>
+            <a:r>
+              <a:rPr lang="de-CH" sz="1000" b="1" dirty="0" err="1"/>
+              <a:t>Evaluate</a:t>
+            </a:r>
+            <a:r>
+              <a:rPr lang="de-CH" sz="1000" b="1" dirty="0"/>
+              <a:t> Default Page</a:t>
+            </a:r>
+          </a:p>
+        </p:txBody>
+      </p:sp>
+      <p:cxnSp>
+        <p:nvCxnSpPr>
+          <p:cNvPr id="73" name="Connector: Elbow 72">
+            <a:extLst>
+              <a:ext uri="{FF2B5EF4-FFF2-40B4-BE49-F238E27FC236}">
+                <a16:creationId xmlns:a16="http://schemas.microsoft.com/office/drawing/2014/main" id="{A83A0D11-44C8-E444-76A1-4EE0B077D534}"/>
+              </a:ext>
+            </a:extLst>
+          </p:cNvPr>
+          <p:cNvCxnSpPr>
+            <a:cxnSpLocks/>
+          </p:cNvCxnSpPr>
+          <p:nvPr/>
+        </p:nvCxnSpPr>
+        <p:spPr>
+          <a:xfrm rot="16200000" flipH="1">
+            <a:off x="3583459" y="3583680"/>
+            <a:ext cx="1059775" cy="9104"/>
           </a:xfrm>
           <a:prstGeom prst="bentConnector3">
             <a:avLst>

</xml_diff>